<commit_message>
Add NLMS section to anc
</commit_message>
<xml_diff>
--- a/support/drawing/algorithm_iteration_02.pptx
+++ b/support/drawing/algorithm_iteration_02.pptx
@@ -261,7 +261,7 @@
           <a:p>
             <a:fld id="{37497929-6E87-4835-A587-4E00D62474E9}" type="datetimeFigureOut">
               <a:rPr lang="es-AR" smtClean="0"/>
-              <a:t>10/10/2021</a:t>
+              <a:t>17/10/2021</a:t>
             </a:fld>
             <a:endParaRPr lang="es-AR"/>
           </a:p>
@@ -315,7 +315,7 @@
           <a:p>
             <a:fld id="{24DF2E81-514C-4EE2-B19B-027432498A6D}" type="slidenum">
               <a:rPr lang="es-AR" smtClean="0"/>
-              <a:t>‹Nº›</a:t>
+              <a:t>‹#›</a:t>
             </a:fld>
             <a:endParaRPr lang="es-AR"/>
           </a:p>
@@ -461,7 +461,7 @@
           <a:p>
             <a:fld id="{37497929-6E87-4835-A587-4E00D62474E9}" type="datetimeFigureOut">
               <a:rPr lang="es-AR" smtClean="0"/>
-              <a:t>10/10/2021</a:t>
+              <a:t>17/10/2021</a:t>
             </a:fld>
             <a:endParaRPr lang="es-AR"/>
           </a:p>
@@ -515,7 +515,7 @@
           <a:p>
             <a:fld id="{24DF2E81-514C-4EE2-B19B-027432498A6D}" type="slidenum">
               <a:rPr lang="es-AR" smtClean="0"/>
-              <a:t>‹Nº›</a:t>
+              <a:t>‹#›</a:t>
             </a:fld>
             <a:endParaRPr lang="es-AR"/>
           </a:p>
@@ -671,7 +671,7 @@
           <a:p>
             <a:fld id="{37497929-6E87-4835-A587-4E00D62474E9}" type="datetimeFigureOut">
               <a:rPr lang="es-AR" smtClean="0"/>
-              <a:t>10/10/2021</a:t>
+              <a:t>17/10/2021</a:t>
             </a:fld>
             <a:endParaRPr lang="es-AR"/>
           </a:p>
@@ -725,7 +725,7 @@
           <a:p>
             <a:fld id="{24DF2E81-514C-4EE2-B19B-027432498A6D}" type="slidenum">
               <a:rPr lang="es-AR" smtClean="0"/>
-              <a:t>‹Nº›</a:t>
+              <a:t>‹#›</a:t>
             </a:fld>
             <a:endParaRPr lang="es-AR"/>
           </a:p>
@@ -871,7 +871,7 @@
           <a:p>
             <a:fld id="{37497929-6E87-4835-A587-4E00D62474E9}" type="datetimeFigureOut">
               <a:rPr lang="es-AR" smtClean="0"/>
-              <a:t>10/10/2021</a:t>
+              <a:t>17/10/2021</a:t>
             </a:fld>
             <a:endParaRPr lang="es-AR"/>
           </a:p>
@@ -925,7 +925,7 @@
           <a:p>
             <a:fld id="{24DF2E81-514C-4EE2-B19B-027432498A6D}" type="slidenum">
               <a:rPr lang="es-AR" smtClean="0"/>
-              <a:t>‹Nº›</a:t>
+              <a:t>‹#›</a:t>
             </a:fld>
             <a:endParaRPr lang="es-AR"/>
           </a:p>
@@ -1147,7 +1147,7 @@
           <a:p>
             <a:fld id="{37497929-6E87-4835-A587-4E00D62474E9}" type="datetimeFigureOut">
               <a:rPr lang="es-AR" smtClean="0"/>
-              <a:t>10/10/2021</a:t>
+              <a:t>17/10/2021</a:t>
             </a:fld>
             <a:endParaRPr lang="es-AR"/>
           </a:p>
@@ -1201,7 +1201,7 @@
           <a:p>
             <a:fld id="{24DF2E81-514C-4EE2-B19B-027432498A6D}" type="slidenum">
               <a:rPr lang="es-AR" smtClean="0"/>
-              <a:t>‹Nº›</a:t>
+              <a:t>‹#›</a:t>
             </a:fld>
             <a:endParaRPr lang="es-AR"/>
           </a:p>
@@ -1415,7 +1415,7 @@
           <a:p>
             <a:fld id="{37497929-6E87-4835-A587-4E00D62474E9}" type="datetimeFigureOut">
               <a:rPr lang="es-AR" smtClean="0"/>
-              <a:t>10/10/2021</a:t>
+              <a:t>17/10/2021</a:t>
             </a:fld>
             <a:endParaRPr lang="es-AR"/>
           </a:p>
@@ -1469,7 +1469,7 @@
           <a:p>
             <a:fld id="{24DF2E81-514C-4EE2-B19B-027432498A6D}" type="slidenum">
               <a:rPr lang="es-AR" smtClean="0"/>
-              <a:t>‹Nº›</a:t>
+              <a:t>‹#›</a:t>
             </a:fld>
             <a:endParaRPr lang="es-AR"/>
           </a:p>
@@ -1830,7 +1830,7 @@
           <a:p>
             <a:fld id="{37497929-6E87-4835-A587-4E00D62474E9}" type="datetimeFigureOut">
               <a:rPr lang="es-AR" smtClean="0"/>
-              <a:t>10/10/2021</a:t>
+              <a:t>17/10/2021</a:t>
             </a:fld>
             <a:endParaRPr lang="es-AR"/>
           </a:p>
@@ -1884,7 +1884,7 @@
           <a:p>
             <a:fld id="{24DF2E81-514C-4EE2-B19B-027432498A6D}" type="slidenum">
               <a:rPr lang="es-AR" smtClean="0"/>
-              <a:t>‹Nº›</a:t>
+              <a:t>‹#›</a:t>
             </a:fld>
             <a:endParaRPr lang="es-AR"/>
           </a:p>
@@ -1972,7 +1972,7 @@
           <a:p>
             <a:fld id="{37497929-6E87-4835-A587-4E00D62474E9}" type="datetimeFigureOut">
               <a:rPr lang="es-AR" smtClean="0"/>
-              <a:t>10/10/2021</a:t>
+              <a:t>17/10/2021</a:t>
             </a:fld>
             <a:endParaRPr lang="es-AR"/>
           </a:p>
@@ -2026,7 +2026,7 @@
           <a:p>
             <a:fld id="{24DF2E81-514C-4EE2-B19B-027432498A6D}" type="slidenum">
               <a:rPr lang="es-AR" smtClean="0"/>
-              <a:t>‹Nº›</a:t>
+              <a:t>‹#›</a:t>
             </a:fld>
             <a:endParaRPr lang="es-AR"/>
           </a:p>
@@ -2085,7 +2085,7 @@
           <a:p>
             <a:fld id="{37497929-6E87-4835-A587-4E00D62474E9}" type="datetimeFigureOut">
               <a:rPr lang="es-AR" smtClean="0"/>
-              <a:t>10/10/2021</a:t>
+              <a:t>17/10/2021</a:t>
             </a:fld>
             <a:endParaRPr lang="es-AR"/>
           </a:p>
@@ -2139,7 +2139,7 @@
           <a:p>
             <a:fld id="{24DF2E81-514C-4EE2-B19B-027432498A6D}" type="slidenum">
               <a:rPr lang="es-AR" smtClean="0"/>
-              <a:t>‹Nº›</a:t>
+              <a:t>‹#›</a:t>
             </a:fld>
             <a:endParaRPr lang="es-AR"/>
           </a:p>
@@ -2398,7 +2398,7 @@
           <a:p>
             <a:fld id="{37497929-6E87-4835-A587-4E00D62474E9}" type="datetimeFigureOut">
               <a:rPr lang="es-AR" smtClean="0"/>
-              <a:t>10/10/2021</a:t>
+              <a:t>17/10/2021</a:t>
             </a:fld>
             <a:endParaRPr lang="es-AR"/>
           </a:p>
@@ -2452,7 +2452,7 @@
           <a:p>
             <a:fld id="{24DF2E81-514C-4EE2-B19B-027432498A6D}" type="slidenum">
               <a:rPr lang="es-AR" smtClean="0"/>
-              <a:t>‹Nº›</a:t>
+              <a:t>‹#›</a:t>
             </a:fld>
             <a:endParaRPr lang="es-AR"/>
           </a:p>
@@ -2687,7 +2687,7 @@
           <a:p>
             <a:fld id="{37497929-6E87-4835-A587-4E00D62474E9}" type="datetimeFigureOut">
               <a:rPr lang="es-AR" smtClean="0"/>
-              <a:t>10/10/2021</a:t>
+              <a:t>17/10/2021</a:t>
             </a:fld>
             <a:endParaRPr lang="es-AR"/>
           </a:p>
@@ -2741,7 +2741,7 @@
           <a:p>
             <a:fld id="{24DF2E81-514C-4EE2-B19B-027432498A6D}" type="slidenum">
               <a:rPr lang="es-AR" smtClean="0"/>
-              <a:t>‹Nº›</a:t>
+              <a:t>‹#›</a:t>
             </a:fld>
             <a:endParaRPr lang="es-AR"/>
           </a:p>
@@ -2930,7 +2930,7 @@
           <a:p>
             <a:fld id="{37497929-6E87-4835-A587-4E00D62474E9}" type="datetimeFigureOut">
               <a:rPr lang="es-AR" smtClean="0"/>
-              <a:t>10/10/2021</a:t>
+              <a:t>17/10/2021</a:t>
             </a:fld>
             <a:endParaRPr lang="es-AR"/>
           </a:p>
@@ -3020,7 +3020,7 @@
           <a:p>
             <a:fld id="{24DF2E81-514C-4EE2-B19B-027432498A6D}" type="slidenum">
               <a:rPr lang="es-AR" smtClean="0"/>
-              <a:t>‹Nº›</a:t>
+              <a:t>‹#›</a:t>
             </a:fld>
             <a:endParaRPr lang="es-AR"/>
           </a:p>
@@ -3347,177 +3347,8 @@
           <a:chExt cx="0" cy="0"/>
         </a:xfrm>
       </p:grpSpPr>
-      <mc:AlternateContent xmlns:mc="http://schemas.openxmlformats.org/markup-compatibility/2006">
-        <mc:Choice xmlns:a14="http://schemas.microsoft.com/office/drawing/2010/main" Requires="a14">
-          <p:sp>
-            <p:nvSpPr>
-              <p:cNvPr id="5" name="CuadroTexto 4">
-                <a:extLst>
-                  <a:ext uri="{FF2B5EF4-FFF2-40B4-BE49-F238E27FC236}">
-                    <a16:creationId xmlns:a16="http://schemas.microsoft.com/office/drawing/2014/main" id="{423CF31E-A378-4019-9BAB-125D90CECA76}"/>
-                  </a:ext>
-                </a:extLst>
-              </p:cNvPr>
-              <p:cNvSpPr txBox="1"/>
-              <p:nvPr/>
-            </p:nvSpPr>
-            <p:spPr>
-              <a:xfrm>
-                <a:off x="4362893" y="1041017"/>
-                <a:ext cx="3466214" cy="461665"/>
-              </a:xfrm>
-              <a:prstGeom prst="rect">
-                <a:avLst/>
-              </a:prstGeom>
-              <a:solidFill>
-                <a:schemeClr val="accent2">
-                  <a:lumMod val="40000"/>
-                  <a:lumOff val="60000"/>
-                </a:schemeClr>
-              </a:solidFill>
-            </p:spPr>
-            <p:style>
-              <a:lnRef idx="2">
-                <a:schemeClr val="dk1"/>
-              </a:lnRef>
-              <a:fillRef idx="1">
-                <a:schemeClr val="lt1"/>
-              </a:fillRef>
-              <a:effectRef idx="0">
-                <a:schemeClr val="dk1"/>
-              </a:effectRef>
-              <a:fontRef idx="minor">
-                <a:schemeClr val="dk1"/>
-              </a:fontRef>
-            </p:style>
-            <p:txBody>
-              <a:bodyPr wrap="square" rtlCol="0">
-                <a:spAutoFit/>
-              </a:bodyPr>
-              <a:lstStyle/>
-              <a:p>
-                <a:pPr algn="ctr"/>
-                <a:r>
-                  <a:rPr lang="es-AR" sz="1200" dirty="0"/>
-                  <a:t>Modelado de </a:t>
-                </a:r>
-                <a14:m>
-                  <m:oMath xmlns:m="http://schemas.openxmlformats.org/officeDocument/2006/math">
-                    <m:r>
-                      <a:rPr lang="es-AR" sz="1200" b="0" i="1" smtClean="0">
-                        <a:latin typeface="Cambria Math" panose="02040503050406030204" pitchFamily="18" charset="0"/>
-                      </a:rPr>
-                      <m:t>𝐺</m:t>
-                    </m:r>
-                    <m:r>
-                      <a:rPr lang="es-AR" sz="1200" b="0" i="1" smtClean="0">
-                        <a:latin typeface="Cambria Math" panose="02040503050406030204" pitchFamily="18" charset="0"/>
-                      </a:rPr>
-                      <m:t>(</m:t>
-                    </m:r>
-                    <m:r>
-                      <a:rPr lang="es-AR" sz="1200" b="0" i="1" smtClean="0">
-                        <a:latin typeface="Cambria Math" panose="02040503050406030204" pitchFamily="18" charset="0"/>
-                      </a:rPr>
-                      <m:t>𝑧</m:t>
-                    </m:r>
-                    <m:r>
-                      <a:rPr lang="es-AR" sz="1200" b="0" i="1" smtClean="0">
-                        <a:latin typeface="Cambria Math" panose="02040503050406030204" pitchFamily="18" charset="0"/>
-                      </a:rPr>
-                      <m:t>)</m:t>
-                    </m:r>
-                  </m:oMath>
-                </a14:m>
-                <a:r>
-                  <a:rPr lang="es-AR" sz="1200" dirty="0"/>
-                  <a:t> con </a:t>
-                </a:r>
-                <a:r>
-                  <a:rPr lang="es-AR" sz="1200" b="1" dirty="0"/>
-                  <a:t>identificación de sistemas</a:t>
-                </a:r>
-                <a:r>
-                  <a:rPr lang="es-AR" sz="1200" dirty="0"/>
-                  <a:t>, se obtienen los coeficientes </a:t>
-                </a:r>
-                <a14:m>
-                  <m:oMath xmlns:m="http://schemas.openxmlformats.org/officeDocument/2006/math">
-                    <m:acc>
-                      <m:accPr>
-                        <m:chr m:val="⃗"/>
-                        <m:ctrlPr>
-                          <a:rPr lang="es-AR" sz="1200" b="0" i="1" smtClean="0">
-                            <a:latin typeface="Cambria Math" panose="02040503050406030204" pitchFamily="18" charset="0"/>
-                          </a:rPr>
-                        </m:ctrlPr>
-                      </m:accPr>
-                      <m:e>
-                        <m:r>
-                          <a:rPr lang="es-AR" sz="1200" b="1" i="1" smtClean="0">
-                            <a:latin typeface="Cambria Math" panose="02040503050406030204" pitchFamily="18" charset="0"/>
-                          </a:rPr>
-                          <m:t>𝒈</m:t>
-                        </m:r>
-                      </m:e>
-                    </m:acc>
-                  </m:oMath>
-                </a14:m>
-                <a:r>
-                  <a:rPr lang="es-AR" sz="1200" dirty="0"/>
-                  <a:t>.</a:t>
-                </a:r>
-              </a:p>
-            </p:txBody>
-          </p:sp>
-        </mc:Choice>
-        <mc:Fallback>
-          <p:sp>
-            <p:nvSpPr>
-              <p:cNvPr id="5" name="CuadroTexto 4">
-                <a:extLst>
-                  <a:ext uri="{FF2B5EF4-FFF2-40B4-BE49-F238E27FC236}">
-                    <a16:creationId xmlns:a16="http://schemas.microsoft.com/office/drawing/2014/main" id="{423CF31E-A378-4019-9BAB-125D90CECA76}"/>
-                  </a:ext>
-                </a:extLst>
-              </p:cNvPr>
-              <p:cNvSpPr txBox="1">
-                <a:spLocks noRot="1" noChangeAspect="1" noMove="1" noResize="1" noEditPoints="1" noAdjustHandles="1" noChangeArrowheads="1" noChangeShapeType="1" noTextEdit="1"/>
-              </p:cNvSpPr>
-              <p:nvPr/>
-            </p:nvSpPr>
-            <p:spPr>
-              <a:xfrm>
-                <a:off x="4362893" y="1041017"/>
-                <a:ext cx="3466214" cy="461665"/>
-              </a:xfrm>
-              <a:prstGeom prst="rect">
-                <a:avLst/>
-              </a:prstGeom>
-              <a:blipFill>
-                <a:blip r:embed="rId2"/>
-                <a:stretch>
-                  <a:fillRect b="-7692"/>
-                </a:stretch>
-              </a:blipFill>
-            </p:spPr>
-            <p:txBody>
-              <a:bodyPr/>
-              <a:lstStyle/>
-              <a:p>
-                <a:r>
-                  <a:rPr lang="es-AR">
-                    <a:noFill/>
-                  </a:rPr>
-                  <a:t> </a:t>
-                </a:r>
-              </a:p>
-            </p:txBody>
-          </p:sp>
-        </mc:Fallback>
-      </mc:AlternateContent>
-      <mc:AlternateContent xmlns:mc="http://schemas.openxmlformats.org/markup-compatibility/2006">
-        <mc:Choice xmlns:a14="http://schemas.microsoft.com/office/drawing/2010/main" Requires="a14">
+      <mc:AlternateContent xmlns:mc="http://schemas.openxmlformats.org/markup-compatibility/2006" xmlns:a14="http://schemas.microsoft.com/office/drawing/2010/main">
+        <mc:Choice Requires="a14">
           <p:sp>
             <p:nvSpPr>
               <p:cNvPr id="7" name="CuadroTexto 6">
@@ -3532,16 +3363,16 @@
             </p:nvSpPr>
             <p:spPr>
               <a:xfrm>
-                <a:off x="4362893" y="1739669"/>
-                <a:ext cx="3466214" cy="461665"/>
+                <a:off x="4362893" y="1051975"/>
+                <a:ext cx="3466214" cy="276999"/>
               </a:xfrm>
               <a:prstGeom prst="rect">
                 <a:avLst/>
               </a:prstGeom>
               <a:solidFill>
                 <a:schemeClr val="accent2">
-                  <a:lumMod val="40000"/>
-                  <a:lumOff val="60000"/>
+                  <a:lumMod val="20000"/>
+                  <a:lumOff val="80000"/>
                 </a:schemeClr>
               </a:solidFill>
             </p:spPr>
@@ -3607,63 +3438,24 @@
                         </m:r>
                       </m:e>
                     </m:d>
-                  </m:oMath>
-                </a14:m>
-                <a:r>
-                  <a:rPr lang="es-AR" sz="1200" dirty="0"/>
-                  <a:t>, </a:t>
-                </a:r>
-                <a14:m>
-                  <m:oMath xmlns:m="http://schemas.openxmlformats.org/officeDocument/2006/math">
-                    <m:acc>
-                      <m:accPr>
-                        <m:chr m:val="⃗"/>
-                        <m:ctrlPr>
-                          <a:rPr lang="es-AR" sz="1200" i="1">
-                            <a:latin typeface="Cambria Math" panose="02040503050406030204" pitchFamily="18" charset="0"/>
-                          </a:rPr>
-                        </m:ctrlPr>
-                      </m:accPr>
-                      <m:e>
-                        <m:r>
-                          <a:rPr lang="es-AR" sz="1200" b="1" i="1">
-                            <a:latin typeface="Cambria Math" panose="02040503050406030204" pitchFamily="18" charset="0"/>
-                          </a:rPr>
-                          <m:t>𝒓</m:t>
-                        </m:r>
-                      </m:e>
-                    </m:acc>
                     <m:r>
-                      <a:rPr lang="es-AR" sz="1200" b="0" i="1" smtClean="0">
+                      <a:rPr lang="es-AR" sz="1200" b="0" i="1" dirty="0" smtClean="0">
                         <a:latin typeface="Cambria Math" panose="02040503050406030204" pitchFamily="18" charset="0"/>
                       </a:rPr>
-                      <m:t>′</m:t>
+                      <m:t> </m:t>
                     </m:r>
-                    <m:d>
-                      <m:dPr>
-                        <m:ctrlPr>
-                          <a:rPr lang="es-AR" sz="1200" i="1" dirty="0">
-                            <a:latin typeface="Cambria Math" panose="02040503050406030204" pitchFamily="18" charset="0"/>
-                          </a:rPr>
-                        </m:ctrlPr>
-                      </m:dPr>
-                      <m:e>
-                        <m:r>
-                          <a:rPr lang="es-AR" sz="1200" i="1" dirty="0">
-                            <a:latin typeface="Cambria Math" panose="02040503050406030204" pitchFamily="18" charset="0"/>
-                          </a:rPr>
-                          <m:t>𝑛</m:t>
-                        </m:r>
-                      </m:e>
-                    </m:d>
-                  </m:oMath>
-                </a14:m>
-                <a:r>
-                  <a:rPr lang="es-AR" sz="1200" dirty="0"/>
-                  <a:t> y </a:t>
-                </a:r>
-                <a14:m>
-                  <m:oMath xmlns:m="http://schemas.openxmlformats.org/officeDocument/2006/math">
+                    <m:r>
+                      <a:rPr lang="es-AR" sz="1200" b="0" i="1" dirty="0" smtClean="0">
+                        <a:latin typeface="Cambria Math" panose="02040503050406030204" pitchFamily="18" charset="0"/>
+                      </a:rPr>
+                      <m:t>𝑦</m:t>
+                    </m:r>
+                    <m:r>
+                      <a:rPr lang="es-AR" sz="1200" b="0" i="1" dirty="0" smtClean="0">
+                        <a:latin typeface="Cambria Math" panose="02040503050406030204" pitchFamily="18" charset="0"/>
+                      </a:rPr>
+                      <m:t> </m:t>
+                    </m:r>
                     <m:acc>
                       <m:accPr>
                         <m:chr m:val="⃗"/>
@@ -3710,7 +3502,7 @@
             </p:txBody>
           </p:sp>
         </mc:Choice>
-        <mc:Fallback>
+        <mc:Fallback xmlns="">
           <p:sp>
             <p:nvSpPr>
               <p:cNvPr id="7" name="CuadroTexto 6">
@@ -3727,16 +3519,16 @@
             </p:nvSpPr>
             <p:spPr>
               <a:xfrm>
-                <a:off x="4362893" y="1739669"/>
-                <a:ext cx="3466214" cy="461665"/>
+                <a:off x="4362893" y="1051975"/>
+                <a:ext cx="3466214" cy="276999"/>
               </a:xfrm>
               <a:prstGeom prst="rect">
                 <a:avLst/>
               </a:prstGeom>
               <a:blipFill>
-                <a:blip r:embed="rId3"/>
+                <a:blip r:embed="rId2"/>
                 <a:stretch>
-                  <a:fillRect b="-7692"/>
+                  <a:fillRect b="-14894"/>
                 </a:stretch>
               </a:blipFill>
             </p:spPr>
@@ -3755,8 +3547,8 @@
           </p:sp>
         </mc:Fallback>
       </mc:AlternateContent>
-      <mc:AlternateContent xmlns:mc="http://schemas.openxmlformats.org/markup-compatibility/2006">
-        <mc:Choice xmlns:a14="http://schemas.microsoft.com/office/drawing/2010/main" Requires="a14">
+      <mc:AlternateContent xmlns:mc="http://schemas.openxmlformats.org/markup-compatibility/2006" xmlns:a14="http://schemas.microsoft.com/office/drawing/2010/main">
+        <mc:Choice Requires="a14">
           <p:sp>
             <p:nvSpPr>
               <p:cNvPr id="8" name="CuadroTexto 7">
@@ -3771,7 +3563,7 @@
             </p:nvSpPr>
             <p:spPr>
               <a:xfrm>
-                <a:off x="4362894" y="2424709"/>
+                <a:off x="4362894" y="1650836"/>
                 <a:ext cx="3466214" cy="461665"/>
               </a:xfrm>
               <a:prstGeom prst="rect">
@@ -3779,8 +3571,8 @@
               </a:prstGeom>
               <a:solidFill>
                 <a:schemeClr val="accent2">
-                  <a:lumMod val="40000"/>
-                  <a:lumOff val="60000"/>
+                  <a:lumMod val="20000"/>
+                  <a:lumOff val="80000"/>
                 </a:schemeClr>
               </a:solidFill>
             </p:spPr>
@@ -3850,7 +3642,7 @@
             </p:txBody>
           </p:sp>
         </mc:Choice>
-        <mc:Fallback>
+        <mc:Fallback xmlns="">
           <p:sp>
             <p:nvSpPr>
               <p:cNvPr id="8" name="CuadroTexto 7">
@@ -3867,16 +3659,16 @@
             </p:nvSpPr>
             <p:spPr>
               <a:xfrm>
-                <a:off x="4362894" y="2424709"/>
+                <a:off x="4362894" y="1650836"/>
                 <a:ext cx="3466214" cy="461665"/>
               </a:xfrm>
               <a:prstGeom prst="rect">
                 <a:avLst/>
               </a:prstGeom>
               <a:blipFill>
-                <a:blip r:embed="rId4"/>
+                <a:blip r:embed="rId3"/>
                 <a:stretch>
-                  <a:fillRect b="-3896"/>
+                  <a:fillRect b="-2564"/>
                 </a:stretch>
               </a:blipFill>
             </p:spPr>
@@ -3895,8 +3687,8 @@
           </p:sp>
         </mc:Fallback>
       </mc:AlternateContent>
-      <mc:AlternateContent xmlns:mc="http://schemas.openxmlformats.org/markup-compatibility/2006">
-        <mc:Choice xmlns:a14="http://schemas.microsoft.com/office/drawing/2010/main" Requires="a14">
+      <mc:AlternateContent xmlns:mc="http://schemas.openxmlformats.org/markup-compatibility/2006" xmlns:a14="http://schemas.microsoft.com/office/drawing/2010/main">
+        <mc:Choice Requires="a14">
           <p:sp>
             <p:nvSpPr>
               <p:cNvPr id="10" name="CuadroTexto 9">
@@ -3911,7 +3703,7 @@
             </p:nvSpPr>
             <p:spPr>
               <a:xfrm>
-                <a:off x="4362893" y="3140191"/>
+                <a:off x="4362893" y="2433703"/>
                 <a:ext cx="3466214" cy="646331"/>
               </a:xfrm>
               <a:prstGeom prst="rect">
@@ -3919,8 +3711,8 @@
               </a:prstGeom>
               <a:solidFill>
                 <a:schemeClr val="accent2">
-                  <a:lumMod val="40000"/>
-                  <a:lumOff val="60000"/>
+                  <a:lumMod val="20000"/>
+                  <a:lumOff val="80000"/>
                 </a:schemeClr>
               </a:solidFill>
             </p:spPr>
@@ -3993,13 +3785,7 @@
                         <a:rPr lang="es-AR" sz="1200" b="0" i="1" smtClean="0">
                           <a:latin typeface="Cambria Math" panose="02040503050406030204" pitchFamily="18" charset="0"/>
                         </a:rPr>
-                        <m:t>=</m:t>
-                      </m:r>
-                      <m:r>
-                        <a:rPr lang="es-AR" sz="1200" b="0" i="1" smtClean="0">
-                          <a:latin typeface="Cambria Math" panose="02040503050406030204" pitchFamily="18" charset="0"/>
-                        </a:rPr>
-                        <m:t>−</m:t>
+                        <m:t>=−</m:t>
                       </m:r>
                       <m:sSup>
                         <m:sSupPr>
@@ -4105,7 +3891,7 @@
             </p:txBody>
           </p:sp>
         </mc:Choice>
-        <mc:Fallback>
+        <mc:Fallback xmlns="">
           <p:sp>
             <p:nvSpPr>
               <p:cNvPr id="10" name="CuadroTexto 9">
@@ -4122,14 +3908,14 @@
             </p:nvSpPr>
             <p:spPr>
               <a:xfrm>
-                <a:off x="4362893" y="3140191"/>
+                <a:off x="4362893" y="2433703"/>
                 <a:ext cx="3466214" cy="646331"/>
               </a:xfrm>
               <a:prstGeom prst="rect">
                 <a:avLst/>
               </a:prstGeom>
               <a:blipFill>
-                <a:blip r:embed="rId5"/>
+                <a:blip r:embed="rId4"/>
                 <a:stretch>
                   <a:fillRect r="-351" b="-2778"/>
                 </a:stretch>
@@ -4166,16 +3952,16 @@
             </p:nvSpPr>
             <p:spPr>
               <a:xfrm>
-                <a:off x="4362894" y="5362006"/>
-                <a:ext cx="3466214" cy="499367"/>
+                <a:off x="4362894" y="3990221"/>
+                <a:ext cx="3466214" cy="565732"/>
               </a:xfrm>
               <a:prstGeom prst="rect">
                 <a:avLst/>
               </a:prstGeom>
               <a:solidFill>
                 <a:schemeClr val="accent2">
-                  <a:lumMod val="40000"/>
-                  <a:lumOff val="60000"/>
+                  <a:lumMod val="20000"/>
+                  <a:lumOff val="80000"/>
                 </a:schemeClr>
               </a:solidFill>
             </p:spPr>
@@ -4297,12 +4083,111 @@
                       </a:rPr>
                       <m:t>+</m:t>
                     </m:r>
-                    <m:r>
-                      <a:rPr lang="es-AR" sz="1200" b="0" i="1" dirty="0" smtClean="0">
-                        <a:latin typeface="Cambria Math" panose="02040503050406030204" pitchFamily="18" charset="0"/>
-                      </a:rPr>
-                      <m:t>𝜇</m:t>
-                    </m:r>
+                    <m:f>
+                      <m:fPr>
+                        <m:ctrlPr>
+                          <a:rPr lang="es-AR" sz="1200" i="1" dirty="0">
+                            <a:latin typeface="Cambria Math" panose="02040503050406030204" pitchFamily="18" charset="0"/>
+                          </a:rPr>
+                        </m:ctrlPr>
+                      </m:fPr>
+                      <m:num>
+                        <m:acc>
+                          <m:accPr>
+                            <m:chr m:val="̃"/>
+                            <m:ctrlPr>
+                              <a:rPr lang="es-AR" sz="1200" i="1" dirty="0">
+                                <a:latin typeface="Cambria Math" panose="02040503050406030204" pitchFamily="18" charset="0"/>
+                              </a:rPr>
+                            </m:ctrlPr>
+                          </m:accPr>
+                          <m:e>
+                            <m:r>
+                              <a:rPr lang="es-AR" sz="1200" i="1" dirty="0">
+                                <a:latin typeface="Cambria Math" panose="02040503050406030204" pitchFamily="18" charset="0"/>
+                                <a:ea typeface="Cambria Math" panose="02040503050406030204" pitchFamily="18" charset="0"/>
+                              </a:rPr>
+                              <m:t>𝜇</m:t>
+                            </m:r>
+                          </m:e>
+                        </m:acc>
+                      </m:num>
+                      <m:den>
+                        <m:sSup>
+                          <m:sSupPr>
+                            <m:ctrlPr>
+                              <a:rPr lang="es-AR" sz="1200" i="1" dirty="0">
+                                <a:latin typeface="Cambria Math" panose="02040503050406030204" pitchFamily="18" charset="0"/>
+                              </a:rPr>
+                            </m:ctrlPr>
+                          </m:sSupPr>
+                          <m:e>
+                            <m:d>
+                              <m:dPr>
+                                <m:begChr m:val="‖"/>
+                                <m:endChr m:val="‖"/>
+                                <m:ctrlPr>
+                                  <a:rPr lang="es-AR" sz="1200" i="1" dirty="0">
+                                    <a:latin typeface="Cambria Math" panose="02040503050406030204" pitchFamily="18" charset="0"/>
+                                  </a:rPr>
+                                </m:ctrlPr>
+                              </m:dPr>
+                              <m:e>
+                                <m:acc>
+                                  <m:accPr>
+                                    <m:chr m:val="⃗"/>
+                                    <m:ctrlPr>
+                                      <a:rPr lang="es-AR" sz="1200" i="1" dirty="0">
+                                        <a:latin typeface="Cambria Math" panose="02040503050406030204" pitchFamily="18" charset="0"/>
+                                      </a:rPr>
+                                    </m:ctrlPr>
+                                  </m:accPr>
+                                  <m:e>
+                                    <m:r>
+                                      <a:rPr lang="es-AR" sz="1200" b="1" i="1" dirty="0">
+                                        <a:latin typeface="Cambria Math" panose="02040503050406030204" pitchFamily="18" charset="0"/>
+                                      </a:rPr>
+                                      <m:t>𝒓</m:t>
+                                    </m:r>
+                                    <m:r>
+                                      <a:rPr lang="es-AR" sz="1200" b="1" i="1" dirty="0">
+                                        <a:latin typeface="Cambria Math" panose="02040503050406030204" pitchFamily="18" charset="0"/>
+                                      </a:rPr>
+                                      <m:t>′</m:t>
+                                    </m:r>
+                                  </m:e>
+                                </m:acc>
+                                <m:d>
+                                  <m:dPr>
+                                    <m:ctrlPr>
+                                      <a:rPr lang="es-AR" sz="1200" i="1" dirty="0">
+                                        <a:latin typeface="Cambria Math" panose="02040503050406030204" pitchFamily="18" charset="0"/>
+                                      </a:rPr>
+                                    </m:ctrlPr>
+                                  </m:dPr>
+                                  <m:e>
+                                    <m:r>
+                                      <a:rPr lang="es-AR" sz="1200" i="1" dirty="0">
+                                        <a:latin typeface="Cambria Math" panose="02040503050406030204" pitchFamily="18" charset="0"/>
+                                      </a:rPr>
+                                      <m:t>𝑛</m:t>
+                                    </m:r>
+                                  </m:e>
+                                </m:d>
+                              </m:e>
+                            </m:d>
+                          </m:e>
+                          <m:sup>
+                            <m:r>
+                              <a:rPr lang="en-AU" sz="1200" i="1" dirty="0">
+                                <a:latin typeface="Cambria Math" panose="02040503050406030204" pitchFamily="18" charset="0"/>
+                              </a:rPr>
+                              <m:t>2</m:t>
+                            </m:r>
+                          </m:sup>
+                        </m:sSup>
+                      </m:den>
+                    </m:f>
                     <m:r>
                       <a:rPr lang="es-AR" sz="1200" b="0" i="1" dirty="0" smtClean="0">
                         <a:latin typeface="Cambria Math" panose="02040503050406030204" pitchFamily="18" charset="0"/>
@@ -4324,12 +4209,6 @@
                             <a:latin typeface="Cambria Math" panose="02040503050406030204" pitchFamily="18" charset="0"/>
                           </a:rPr>
                           <m:t>𝒓</m:t>
-                        </m:r>
-                        <m:r>
-                          <a:rPr lang="es-AR" sz="1200" b="1" i="1" dirty="0" smtClean="0">
-                            <a:latin typeface="Cambria Math" panose="02040503050406030204" pitchFamily="18" charset="0"/>
-                          </a:rPr>
-                          <m:t>′</m:t>
                         </m:r>
                       </m:e>
                     </m:acc>
@@ -4407,16 +4286,16 @@
             </p:nvSpPr>
             <p:spPr>
               <a:xfrm>
-                <a:off x="4362894" y="5362006"/>
-                <a:ext cx="3466214" cy="499367"/>
+                <a:off x="4362894" y="3990221"/>
+                <a:ext cx="3466214" cy="565732"/>
               </a:xfrm>
               <a:prstGeom prst="rect">
                 <a:avLst/>
               </a:prstGeom>
               <a:blipFill>
-                <a:blip r:embed="rId6"/>
+                <a:blip r:embed="rId5"/>
                 <a:stretch>
-                  <a:fillRect b="-3571"/>
+                  <a:fillRect/>
                 </a:stretch>
               </a:blipFill>
             </p:spPr>
@@ -4425,7 +4304,7 @@
               <a:lstStyle/>
               <a:p>
                 <a:r>
-                  <a:rPr lang="es-AR">
+                  <a:rPr lang="en-US">
                     <a:noFill/>
                   </a:rPr>
                   <a:t> </a:t>
@@ -4437,24 +4316,23 @@
       </mc:AlternateContent>
       <p:cxnSp>
         <p:nvCxnSpPr>
-          <p:cNvPr id="15" name="Conector recto de flecha 14">
-            <a:extLst>
-              <a:ext uri="{FF2B5EF4-FFF2-40B4-BE49-F238E27FC236}">
-                <a16:creationId xmlns:a16="http://schemas.microsoft.com/office/drawing/2014/main" id="{18CBD793-E20E-42A8-964E-5A640582AEEF}"/>
+          <p:cNvPr id="17" name="Conector recto de flecha 16">
+            <a:extLst>
+              <a:ext uri="{FF2B5EF4-FFF2-40B4-BE49-F238E27FC236}">
+                <a16:creationId xmlns:a16="http://schemas.microsoft.com/office/drawing/2014/main" id="{93925E50-3EC5-43CD-8AB8-8FC1075ACB24}"/>
               </a:ext>
             </a:extLst>
           </p:cNvPr>
           <p:cNvCxnSpPr>
-            <a:cxnSpLocks/>
-            <a:stCxn id="5" idx="2"/>
-            <a:endCxn id="7" idx="0"/>
+            <a:stCxn id="7" idx="2"/>
+            <a:endCxn id="8" idx="0"/>
           </p:cNvCxnSpPr>
           <p:nvPr/>
         </p:nvCxnSpPr>
         <p:spPr>
           <a:xfrm>
-            <a:off x="6096000" y="1502682"/>
-            <a:ext cx="0" cy="236987"/>
+            <a:off x="6096000" y="1328974"/>
+            <a:ext cx="1" cy="321862"/>
           </a:xfrm>
           <a:prstGeom prst="straightConnector1">
             <a:avLst/>
@@ -4480,52 +4358,10 @@
       </p:cxnSp>
       <p:cxnSp>
         <p:nvCxnSpPr>
-          <p:cNvPr id="17" name="Conector recto de flecha 16">
-            <a:extLst>
-              <a:ext uri="{FF2B5EF4-FFF2-40B4-BE49-F238E27FC236}">
-                <a16:creationId xmlns:a16="http://schemas.microsoft.com/office/drawing/2014/main" id="{93925E50-3EC5-43CD-8AB8-8FC1075ACB24}"/>
-              </a:ext>
-            </a:extLst>
-          </p:cNvPr>
-          <p:cNvCxnSpPr>
-            <a:stCxn id="7" idx="2"/>
-            <a:endCxn id="8" idx="0"/>
-          </p:cNvCxnSpPr>
-          <p:nvPr/>
-        </p:nvCxnSpPr>
-        <p:spPr>
-          <a:xfrm>
-            <a:off x="6096000" y="2201334"/>
-            <a:ext cx="1" cy="223375"/>
-          </a:xfrm>
-          <a:prstGeom prst="straightConnector1">
-            <a:avLst/>
-          </a:prstGeom>
-          <a:ln>
-            <a:tailEnd type="triangle"/>
-          </a:ln>
-        </p:spPr>
-        <p:style>
-          <a:lnRef idx="1">
-            <a:schemeClr val="dk1"/>
-          </a:lnRef>
-          <a:fillRef idx="0">
-            <a:schemeClr val="dk1"/>
-          </a:fillRef>
-          <a:effectRef idx="0">
-            <a:schemeClr val="dk1"/>
-          </a:effectRef>
-          <a:fontRef idx="minor">
-            <a:schemeClr val="tx1"/>
-          </a:fontRef>
-        </p:style>
-      </p:cxnSp>
-      <p:cxnSp>
-        <p:nvCxnSpPr>
-          <p:cNvPr id="21" name="Conector recto de flecha 20">
-            <a:extLst>
-              <a:ext uri="{FF2B5EF4-FFF2-40B4-BE49-F238E27FC236}">
-                <a16:creationId xmlns:a16="http://schemas.microsoft.com/office/drawing/2014/main" id="{A715EDFD-4747-46F2-A6EF-2E6F95DB61AC}"/>
+          <p:cNvPr id="19" name="Conector recto de flecha 18">
+            <a:extLst>
+              <a:ext uri="{FF2B5EF4-FFF2-40B4-BE49-F238E27FC236}">
+                <a16:creationId xmlns:a16="http://schemas.microsoft.com/office/drawing/2014/main" id="{D0BB9913-F708-4D63-8F9D-0FD1C9B96771}"/>
               </a:ext>
             </a:extLst>
           </p:cNvPr>
@@ -4538,8 +4374,8 @@
         </p:nvCxnSpPr>
         <p:spPr>
           <a:xfrm flipH="1">
-            <a:off x="6096000" y="2886374"/>
-            <a:ext cx="1" cy="253817"/>
+            <a:off x="6096000" y="2112501"/>
+            <a:ext cx="1" cy="321202"/>
           </a:xfrm>
           <a:prstGeom prst="straightConnector1">
             <a:avLst/>
@@ -4581,12 +4417,12 @@
         </p:nvCxnSpPr>
         <p:spPr>
           <a:xfrm rot="5400000" flipH="1">
-            <a:off x="3626532" y="3391905"/>
-            <a:ext cx="3205831" cy="1733107"/>
+            <a:off x="3892306" y="2352258"/>
+            <a:ext cx="2674284" cy="1733107"/>
           </a:xfrm>
           <a:prstGeom prst="bentConnector4">
             <a:avLst>
-              <a:gd name="adj1" fmla="val -7131"/>
+              <a:gd name="adj1" fmla="val -8548"/>
               <a:gd name="adj2" fmla="val 113190"/>
             </a:avLst>
           </a:prstGeom>
@@ -4623,7 +4459,7 @@
         </p:nvSpPr>
         <p:spPr>
           <a:xfrm>
-            <a:off x="2629786" y="4029670"/>
+            <a:off x="2629786" y="2541424"/>
             <a:ext cx="1447800" cy="430887"/>
           </a:xfrm>
           <a:prstGeom prst="rect">
@@ -4645,8 +4481,8 @@
           </a:p>
         </p:txBody>
       </p:sp>
-      <mc:AlternateContent xmlns:mc="http://schemas.openxmlformats.org/markup-compatibility/2006">
-        <mc:Choice xmlns:a14="http://schemas.microsoft.com/office/drawing/2010/main" Requires="a14">
+      <mc:AlternateContent xmlns:mc="http://schemas.openxmlformats.org/markup-compatibility/2006" xmlns:a14="http://schemas.microsoft.com/office/drawing/2010/main">
+        <mc:Choice Requires="a14">
           <p:sp>
             <p:nvSpPr>
               <p:cNvPr id="43" name="CuadroTexto 42">
@@ -4661,7 +4497,7 @@
             </p:nvSpPr>
             <p:spPr>
               <a:xfrm>
-                <a:off x="4362893" y="4106615"/>
+                <a:off x="4362894" y="3396628"/>
                 <a:ext cx="3466214" cy="276999"/>
               </a:xfrm>
               <a:prstGeom prst="rect">
@@ -4669,8 +4505,8 @@
               </a:prstGeom>
               <a:solidFill>
                 <a:schemeClr val="accent2">
-                  <a:lumMod val="40000"/>
-                  <a:lumOff val="60000"/>
+                  <a:lumMod val="20000"/>
+                  <a:lumOff val="80000"/>
                 </a:schemeClr>
               </a:solidFill>
             </p:spPr>
@@ -4734,7 +4570,7 @@
             </p:txBody>
           </p:sp>
         </mc:Choice>
-        <mc:Fallback>
+        <mc:Fallback xmlns="">
           <p:sp>
             <p:nvSpPr>
               <p:cNvPr id="43" name="CuadroTexto 42">
@@ -4751,16 +4587,16 @@
             </p:nvSpPr>
             <p:spPr>
               <a:xfrm>
-                <a:off x="4362893" y="4106615"/>
+                <a:off x="4362894" y="3396628"/>
                 <a:ext cx="3466214" cy="276999"/>
               </a:xfrm>
               <a:prstGeom prst="rect">
                 <a:avLst/>
               </a:prstGeom>
               <a:blipFill>
-                <a:blip r:embed="rId7"/>
+                <a:blip r:embed="rId6"/>
                 <a:stretch>
-                  <a:fillRect b="-14894"/>
+                  <a:fillRect b="-12500"/>
                 </a:stretch>
               </a:blipFill>
             </p:spPr>
@@ -4796,337 +4632,8 @@
         </p:nvCxnSpPr>
         <p:spPr>
           <a:xfrm>
-            <a:off x="6096000" y="3786522"/>
-            <a:ext cx="0" cy="320093"/>
-          </a:xfrm>
-          <a:prstGeom prst="straightConnector1">
-            <a:avLst/>
-          </a:prstGeom>
-          <a:ln>
-            <a:tailEnd type="triangle"/>
-          </a:ln>
-        </p:spPr>
-        <p:style>
-          <a:lnRef idx="1">
-            <a:schemeClr val="dk1"/>
-          </a:lnRef>
-          <a:fillRef idx="0">
-            <a:schemeClr val="dk1"/>
-          </a:fillRef>
-          <a:effectRef idx="0">
-            <a:schemeClr val="dk1"/>
-          </a:effectRef>
-          <a:fontRef idx="minor">
-            <a:schemeClr val="tx1"/>
-          </a:fontRef>
-        </p:style>
-      </p:cxnSp>
-      <mc:AlternateContent xmlns:mc="http://schemas.openxmlformats.org/markup-compatibility/2006">
-        <mc:Choice xmlns:a14="http://schemas.microsoft.com/office/drawing/2010/main" Requires="a14">
-          <p:sp>
-            <p:nvSpPr>
-              <p:cNvPr id="26" name="CuadroTexto 25">
-                <a:extLst>
-                  <a:ext uri="{FF2B5EF4-FFF2-40B4-BE49-F238E27FC236}">
-                    <a16:creationId xmlns:a16="http://schemas.microsoft.com/office/drawing/2014/main" id="{ABCDBD2C-D232-4F48-8A19-A82C10F73FAE}"/>
-                  </a:ext>
-                </a:extLst>
-              </p:cNvPr>
-              <p:cNvSpPr txBox="1"/>
-              <p:nvPr/>
-            </p:nvSpPr>
-            <p:spPr>
-              <a:xfrm>
-                <a:off x="4362893" y="4637431"/>
-                <a:ext cx="3466214" cy="467820"/>
-              </a:xfrm>
-              <a:prstGeom prst="rect">
-                <a:avLst/>
-              </a:prstGeom>
-              <a:solidFill>
-                <a:schemeClr val="accent2">
-                  <a:lumMod val="40000"/>
-                  <a:lumOff val="60000"/>
-                </a:schemeClr>
-              </a:solidFill>
-            </p:spPr>
-            <p:style>
-              <a:lnRef idx="2">
-                <a:schemeClr val="dk1"/>
-              </a:lnRef>
-              <a:fillRef idx="1">
-                <a:schemeClr val="lt1"/>
-              </a:fillRef>
-              <a:effectRef idx="0">
-                <a:schemeClr val="dk1"/>
-              </a:effectRef>
-              <a:fontRef idx="minor">
-                <a:schemeClr val="dk1"/>
-              </a:fontRef>
-            </p:style>
-            <p:txBody>
-              <a:bodyPr wrap="square" rtlCol="0">
-                <a:spAutoFit/>
-              </a:bodyPr>
-              <a:lstStyle/>
-              <a:p>
-                <a:pPr algn="ctr"/>
-                <a:r>
-                  <a:rPr lang="es-AR" sz="1200" dirty="0"/>
-                  <a:t>Se aplica el filtrado </a:t>
-                </a:r>
-                <a14:m>
-                  <m:oMath xmlns:m="http://schemas.openxmlformats.org/officeDocument/2006/math">
-                    <m:acc>
-                      <m:accPr>
-                        <m:chr m:val="̂"/>
-                        <m:ctrlPr>
-                          <a:rPr lang="es-AR" sz="1200" b="0" i="1" smtClean="0">
-                            <a:latin typeface="Cambria Math" panose="02040503050406030204" pitchFamily="18" charset="0"/>
-                          </a:rPr>
-                        </m:ctrlPr>
-                      </m:accPr>
-                      <m:e>
-                        <m:r>
-                          <a:rPr lang="es-AR" sz="1200" b="0" i="1" smtClean="0">
-                            <a:latin typeface="Cambria Math" panose="02040503050406030204" pitchFamily="18" charset="0"/>
-                          </a:rPr>
-                          <m:t>𝐺</m:t>
-                        </m:r>
-                      </m:e>
-                    </m:acc>
-                    <m:r>
-                      <a:rPr lang="es-AR" sz="1200" b="0" i="1" dirty="0" smtClean="0">
-                        <a:latin typeface="Cambria Math" panose="02040503050406030204" pitchFamily="18" charset="0"/>
-                      </a:rPr>
-                      <m:t>(</m:t>
-                    </m:r>
-                    <m:r>
-                      <a:rPr lang="es-AR" sz="1200" b="0" i="1" dirty="0" smtClean="0">
-                        <a:latin typeface="Cambria Math" panose="02040503050406030204" pitchFamily="18" charset="0"/>
-                      </a:rPr>
-                      <m:t>𝑧</m:t>
-                    </m:r>
-                    <m:r>
-                      <a:rPr lang="es-AR" sz="1200" b="0" i="1" dirty="0" smtClean="0">
-                        <a:latin typeface="Cambria Math" panose="02040503050406030204" pitchFamily="18" charset="0"/>
-                      </a:rPr>
-                      <m:t>)</m:t>
-                    </m:r>
-                  </m:oMath>
-                </a14:m>
-                <a:r>
-                  <a:rPr lang="es-AR" sz="1200" dirty="0"/>
-                  <a:t> a la señal de referencia</a:t>
-                </a:r>
-              </a:p>
-              <a:p>
-                <a:pPr algn="ctr"/>
-                <a14:m>
-                  <m:oMathPara xmlns:m="http://schemas.openxmlformats.org/officeDocument/2006/math">
-                    <m:oMathParaPr>
-                      <m:jc m:val="centerGroup"/>
-                    </m:oMathParaPr>
-                    <m:oMath xmlns:m="http://schemas.openxmlformats.org/officeDocument/2006/math">
-                      <m:sSup>
-                        <m:sSupPr>
-                          <m:ctrlPr>
-                            <a:rPr lang="es-AR" sz="1200" b="0" i="1" smtClean="0">
-                              <a:latin typeface="Cambria Math" panose="02040503050406030204" pitchFamily="18" charset="0"/>
-                            </a:rPr>
-                          </m:ctrlPr>
-                        </m:sSupPr>
-                        <m:e>
-                          <m:r>
-                            <a:rPr lang="es-AR" sz="1200" b="0" i="1" smtClean="0">
-                              <a:latin typeface="Cambria Math" panose="02040503050406030204" pitchFamily="18" charset="0"/>
-                            </a:rPr>
-                            <m:t>𝑟</m:t>
-                          </m:r>
-                        </m:e>
-                        <m:sup>
-                          <m:r>
-                            <a:rPr lang="es-AR" sz="1200" b="0" i="1" smtClean="0">
-                              <a:latin typeface="Cambria Math" panose="02040503050406030204" pitchFamily="18" charset="0"/>
-                            </a:rPr>
-                            <m:t>′</m:t>
-                          </m:r>
-                        </m:sup>
-                      </m:sSup>
-                      <m:d>
-                        <m:dPr>
-                          <m:ctrlPr>
-                            <a:rPr lang="es-AR" sz="1200" b="0" i="1" smtClean="0">
-                              <a:latin typeface="Cambria Math" panose="02040503050406030204" pitchFamily="18" charset="0"/>
-                            </a:rPr>
-                          </m:ctrlPr>
-                        </m:dPr>
-                        <m:e>
-                          <m:r>
-                            <a:rPr lang="es-AR" sz="1200" b="0" i="1" smtClean="0">
-                              <a:latin typeface="Cambria Math" panose="02040503050406030204" pitchFamily="18" charset="0"/>
-                            </a:rPr>
-                            <m:t>𝑛</m:t>
-                          </m:r>
-                        </m:e>
-                      </m:d>
-                      <m:r>
-                        <a:rPr lang="es-AR" sz="1200" b="0" i="1" smtClean="0">
-                          <a:latin typeface="Cambria Math" panose="02040503050406030204" pitchFamily="18" charset="0"/>
-                        </a:rPr>
-                        <m:t>=</m:t>
-                      </m:r>
-                      <m:sSup>
-                        <m:sSupPr>
-                          <m:ctrlPr>
-                            <a:rPr lang="es-AR" sz="1200" i="1" dirty="0">
-                              <a:latin typeface="Cambria Math" panose="02040503050406030204" pitchFamily="18" charset="0"/>
-                            </a:rPr>
-                          </m:ctrlPr>
-                        </m:sSupPr>
-                        <m:e>
-                          <m:acc>
-                            <m:accPr>
-                              <m:chr m:val="⃗"/>
-                              <m:ctrlPr>
-                                <a:rPr lang="es-AR" sz="1200" i="1" dirty="0">
-                                  <a:latin typeface="Cambria Math" panose="02040503050406030204" pitchFamily="18" charset="0"/>
-                                </a:rPr>
-                              </m:ctrlPr>
-                            </m:accPr>
-                            <m:e>
-                              <m:r>
-                                <a:rPr lang="es-AR" sz="1200" b="1" i="1" dirty="0">
-                                  <a:latin typeface="Cambria Math" panose="02040503050406030204" pitchFamily="18" charset="0"/>
-                                </a:rPr>
-                                <m:t>𝒈</m:t>
-                              </m:r>
-                            </m:e>
-                          </m:acc>
-                        </m:e>
-                        <m:sup>
-                          <m:r>
-                            <a:rPr lang="es-AR" sz="1200" i="1" dirty="0">
-                              <a:latin typeface="Cambria Math" panose="02040503050406030204" pitchFamily="18" charset="0"/>
-                            </a:rPr>
-                            <m:t>𝑇</m:t>
-                          </m:r>
-                        </m:sup>
-                      </m:sSup>
-                      <m:r>
-                        <a:rPr lang="es-AR" sz="1200" i="1" dirty="0">
-                          <a:latin typeface="Cambria Math" panose="02040503050406030204" pitchFamily="18" charset="0"/>
-                        </a:rPr>
-                        <m:t>⋅</m:t>
-                      </m:r>
-                      <m:acc>
-                        <m:accPr>
-                          <m:chr m:val="⃗"/>
-                          <m:ctrlPr>
-                            <a:rPr lang="es-AR" sz="1200" i="1" dirty="0">
-                              <a:latin typeface="Cambria Math" panose="02040503050406030204" pitchFamily="18" charset="0"/>
-                            </a:rPr>
-                          </m:ctrlPr>
-                        </m:accPr>
-                        <m:e>
-                          <m:r>
-                            <a:rPr lang="es-AR" sz="1200" b="1" i="1" dirty="0">
-                              <a:latin typeface="Cambria Math" panose="02040503050406030204" pitchFamily="18" charset="0"/>
-                            </a:rPr>
-                            <m:t>𝒓</m:t>
-                          </m:r>
-                        </m:e>
-                      </m:acc>
-                      <m:d>
-                        <m:dPr>
-                          <m:ctrlPr>
-                            <a:rPr lang="es-AR" sz="1200" i="1" dirty="0">
-                              <a:latin typeface="Cambria Math" panose="02040503050406030204" pitchFamily="18" charset="0"/>
-                            </a:rPr>
-                          </m:ctrlPr>
-                        </m:dPr>
-                        <m:e>
-                          <m:r>
-                            <a:rPr lang="es-AR" sz="1200" i="1" dirty="0">
-                              <a:latin typeface="Cambria Math" panose="02040503050406030204" pitchFamily="18" charset="0"/>
-                            </a:rPr>
-                            <m:t>𝑛</m:t>
-                          </m:r>
-                        </m:e>
-                      </m:d>
-                    </m:oMath>
-                  </m:oMathPara>
-                </a14:m>
-                <a:endParaRPr lang="es-AR" sz="1200" dirty="0"/>
-              </a:p>
-            </p:txBody>
-          </p:sp>
-        </mc:Choice>
-        <mc:Fallback>
-          <p:sp>
-            <p:nvSpPr>
-              <p:cNvPr id="26" name="CuadroTexto 25">
-                <a:extLst>
-                  <a:ext uri="{FF2B5EF4-FFF2-40B4-BE49-F238E27FC236}">
-                    <a16:creationId xmlns:a16="http://schemas.microsoft.com/office/drawing/2014/main" id="{ABCDBD2C-D232-4F48-8A19-A82C10F73FAE}"/>
-                  </a:ext>
-                </a:extLst>
-              </p:cNvPr>
-              <p:cNvSpPr txBox="1">
-                <a:spLocks noRot="1" noChangeAspect="1" noMove="1" noResize="1" noEditPoints="1" noAdjustHandles="1" noChangeArrowheads="1" noChangeShapeType="1" noTextEdit="1"/>
-              </p:cNvSpPr>
-              <p:nvPr/>
-            </p:nvSpPr>
-            <p:spPr>
-              <a:xfrm>
-                <a:off x="4362893" y="4637431"/>
-                <a:ext cx="3466214" cy="467820"/>
-              </a:xfrm>
-              <a:prstGeom prst="rect">
-                <a:avLst/>
-              </a:prstGeom>
-              <a:blipFill>
-                <a:blip r:embed="rId8"/>
-                <a:stretch>
-                  <a:fillRect/>
-                </a:stretch>
-              </a:blipFill>
-            </p:spPr>
-            <p:txBody>
-              <a:bodyPr/>
-              <a:lstStyle/>
-              <a:p>
-                <a:r>
-                  <a:rPr lang="es-AR">
-                    <a:noFill/>
-                  </a:rPr>
-                  <a:t> </a:t>
-                </a:r>
-              </a:p>
-            </p:txBody>
-          </p:sp>
-        </mc:Fallback>
-      </mc:AlternateContent>
-      <p:cxnSp>
-        <p:nvCxnSpPr>
-          <p:cNvPr id="31" name="Conector recto de flecha 30">
-            <a:extLst>
-              <a:ext uri="{FF2B5EF4-FFF2-40B4-BE49-F238E27FC236}">
-                <a16:creationId xmlns:a16="http://schemas.microsoft.com/office/drawing/2014/main" id="{D07BFD3B-3544-4239-A0E4-92F1ED7FF709}"/>
-              </a:ext>
-            </a:extLst>
-          </p:cNvPr>
-          <p:cNvCxnSpPr>
-            <a:cxnSpLocks/>
-            <a:stCxn id="43" idx="2"/>
-            <a:endCxn id="26" idx="0"/>
-          </p:cNvCxnSpPr>
-          <p:nvPr/>
-        </p:nvCxnSpPr>
-        <p:spPr>
-          <a:xfrm>
-            <a:off x="6096000" y="4383614"/>
-            <a:ext cx="0" cy="253817"/>
+            <a:off x="6096000" y="3080034"/>
+            <a:ext cx="1" cy="316594"/>
           </a:xfrm>
           <a:prstGeom prst="straightConnector1">
             <a:avLst/>
@@ -5152,24 +4659,23 @@
       </p:cxnSp>
       <p:cxnSp>
         <p:nvCxnSpPr>
-          <p:cNvPr id="34" name="Conector recto de flecha 33">
-            <a:extLst>
-              <a:ext uri="{FF2B5EF4-FFF2-40B4-BE49-F238E27FC236}">
-                <a16:creationId xmlns:a16="http://schemas.microsoft.com/office/drawing/2014/main" id="{26893CAD-8CD1-4DFC-B438-62F6526B371A}"/>
+          <p:cNvPr id="79" name="Conector recto de flecha 78">
+            <a:extLst>
+              <a:ext uri="{FF2B5EF4-FFF2-40B4-BE49-F238E27FC236}">
+                <a16:creationId xmlns:a16="http://schemas.microsoft.com/office/drawing/2014/main" id="{628767A4-93B7-42A1-B45F-E8FAEEE52B97}"/>
               </a:ext>
             </a:extLst>
           </p:cNvPr>
           <p:cNvCxnSpPr>
-            <a:cxnSpLocks/>
-            <a:stCxn id="26" idx="2"/>
+            <a:stCxn id="43" idx="2"/>
             <a:endCxn id="11" idx="0"/>
           </p:cNvCxnSpPr>
           <p:nvPr/>
         </p:nvCxnSpPr>
         <p:spPr>
           <a:xfrm>
-            <a:off x="6096000" y="5105251"/>
-            <a:ext cx="1" cy="256755"/>
+            <a:off x="6096001" y="3673627"/>
+            <a:ext cx="0" cy="316594"/>
           </a:xfrm>
           <a:prstGeom prst="straightConnector1">
             <a:avLst/>

</xml_diff>